<commit_message>
added bellman to presentation
</commit_message>
<xml_diff>
--- a/lukas_chapters.pptx
+++ b/lukas_chapters.pptx
@@ -25,6 +25,7 @@
     <p:sldId id="274" r:id="rId19"/>
     <p:sldId id="275" r:id="rId20"/>
     <p:sldId id="276" r:id="rId21"/>
+    <p:sldId id="277" r:id="rId22"/>
   </p:sldIdLst>
   <p:sldSz cx="12192000" cy="6858000"/>
   <p:notesSz cx="6858000" cy="9144000"/>
@@ -262,7 +263,7 @@
           <a:p>
             <a:fld id="{4ABDDB1E-4DC6-400E-93E9-01B8D6702F69}" type="datetimeFigureOut">
               <a:rPr lang="en-GB" smtClean="0"/>
-              <a:t>13/08/2022</a:t>
+              <a:t>23/08/2022</a:t>
             </a:fld>
             <a:endParaRPr lang="en-GB"/>
           </a:p>
@@ -432,7 +433,7 @@
           <a:p>
             <a:fld id="{4ABDDB1E-4DC6-400E-93E9-01B8D6702F69}" type="datetimeFigureOut">
               <a:rPr lang="en-GB" smtClean="0"/>
-              <a:t>13/08/2022</a:t>
+              <a:t>23/08/2022</a:t>
             </a:fld>
             <a:endParaRPr lang="en-GB"/>
           </a:p>
@@ -612,7 +613,7 @@
           <a:p>
             <a:fld id="{4ABDDB1E-4DC6-400E-93E9-01B8D6702F69}" type="datetimeFigureOut">
               <a:rPr lang="en-GB" smtClean="0"/>
-              <a:t>13/08/2022</a:t>
+              <a:t>23/08/2022</a:t>
             </a:fld>
             <a:endParaRPr lang="en-GB"/>
           </a:p>
@@ -782,7 +783,7 @@
           <a:p>
             <a:fld id="{4ABDDB1E-4DC6-400E-93E9-01B8D6702F69}" type="datetimeFigureOut">
               <a:rPr lang="en-GB" smtClean="0"/>
-              <a:t>13/08/2022</a:t>
+              <a:t>23/08/2022</a:t>
             </a:fld>
             <a:endParaRPr lang="en-GB"/>
           </a:p>
@@ -1028,7 +1029,7 @@
           <a:p>
             <a:fld id="{4ABDDB1E-4DC6-400E-93E9-01B8D6702F69}" type="datetimeFigureOut">
               <a:rPr lang="en-GB" smtClean="0"/>
-              <a:t>13/08/2022</a:t>
+              <a:t>23/08/2022</a:t>
             </a:fld>
             <a:endParaRPr lang="en-GB"/>
           </a:p>
@@ -1260,7 +1261,7 @@
           <a:p>
             <a:fld id="{4ABDDB1E-4DC6-400E-93E9-01B8D6702F69}" type="datetimeFigureOut">
               <a:rPr lang="en-GB" smtClean="0"/>
-              <a:t>13/08/2022</a:t>
+              <a:t>23/08/2022</a:t>
             </a:fld>
             <a:endParaRPr lang="en-GB"/>
           </a:p>
@@ -1627,7 +1628,7 @@
           <a:p>
             <a:fld id="{4ABDDB1E-4DC6-400E-93E9-01B8D6702F69}" type="datetimeFigureOut">
               <a:rPr lang="en-GB" smtClean="0"/>
-              <a:t>13/08/2022</a:t>
+              <a:t>23/08/2022</a:t>
             </a:fld>
             <a:endParaRPr lang="en-GB"/>
           </a:p>
@@ -1745,7 +1746,7 @@
           <a:p>
             <a:fld id="{4ABDDB1E-4DC6-400E-93E9-01B8D6702F69}" type="datetimeFigureOut">
               <a:rPr lang="en-GB" smtClean="0"/>
-              <a:t>13/08/2022</a:t>
+              <a:t>23/08/2022</a:t>
             </a:fld>
             <a:endParaRPr lang="en-GB"/>
           </a:p>
@@ -1840,7 +1841,7 @@
           <a:p>
             <a:fld id="{4ABDDB1E-4DC6-400E-93E9-01B8D6702F69}" type="datetimeFigureOut">
               <a:rPr lang="en-GB" smtClean="0"/>
-              <a:t>13/08/2022</a:t>
+              <a:t>23/08/2022</a:t>
             </a:fld>
             <a:endParaRPr lang="en-GB"/>
           </a:p>
@@ -2117,7 +2118,7 @@
           <a:p>
             <a:fld id="{4ABDDB1E-4DC6-400E-93E9-01B8D6702F69}" type="datetimeFigureOut">
               <a:rPr lang="en-GB" smtClean="0"/>
-              <a:t>13/08/2022</a:t>
+              <a:t>23/08/2022</a:t>
             </a:fld>
             <a:endParaRPr lang="en-GB"/>
           </a:p>
@@ -2370,7 +2371,7 @@
           <a:p>
             <a:fld id="{4ABDDB1E-4DC6-400E-93E9-01B8D6702F69}" type="datetimeFigureOut">
               <a:rPr lang="en-GB" smtClean="0"/>
-              <a:t>13/08/2022</a:t>
+              <a:t>23/08/2022</a:t>
             </a:fld>
             <a:endParaRPr lang="en-GB"/>
           </a:p>
@@ -2583,7 +2584,7 @@
           <a:p>
             <a:fld id="{4ABDDB1E-4DC6-400E-93E9-01B8D6702F69}" type="datetimeFigureOut">
               <a:rPr lang="en-GB" smtClean="0"/>
-              <a:t>13/08/2022</a:t>
+              <a:t>23/08/2022</a:t>
             </a:fld>
             <a:endParaRPr lang="en-GB"/>
           </a:p>
@@ -7854,6 +7855,483 @@
                                         </p:cTn>
                                         <p:tgtEl>
                                           <p:spTgt spid="22"/>
+                                        </p:tgtEl>
+                                        <p:attrNameLst>
+                                          <p:attrName>style.visibility</p:attrName>
+                                        </p:attrNameLst>
+                                      </p:cBhvr>
+                                      <p:to>
+                                        <p:strVal val="visible"/>
+                                      </p:to>
+                                    </p:set>
+                                  </p:childTnLst>
+                                </p:cTn>
+                              </p:par>
+                            </p:childTnLst>
+                          </p:cTn>
+                        </p:par>
+                      </p:childTnLst>
+                    </p:cTn>
+                  </p:par>
+                </p:childTnLst>
+              </p:cTn>
+              <p:prevCondLst>
+                <p:cond evt="onPrev" delay="0">
+                  <p:tgtEl>
+                    <p:sldTgt/>
+                  </p:tgtEl>
+                </p:cond>
+              </p:prevCondLst>
+              <p:nextCondLst>
+                <p:cond evt="onNext" delay="0">
+                  <p:tgtEl>
+                    <p:sldTgt/>
+                  </p:tgtEl>
+                </p:cond>
+              </p:nextCondLst>
+            </p:seq>
+          </p:childTnLst>
+        </p:cTn>
+      </p:par>
+    </p:tnLst>
+  </p:timing>
+</p:sld>
+</file>
+
+<file path=ppt/slides/slide21.xml><?xml version="1.0" encoding="utf-8"?>
+<p:sld xmlns:a="http://schemas.openxmlformats.org/drawingml/2006/main" xmlns:r="http://schemas.openxmlformats.org/officeDocument/2006/relationships" xmlns:p="http://schemas.openxmlformats.org/presentationml/2006/main">
+  <p:cSld>
+    <p:spTree>
+      <p:nvGrpSpPr>
+        <p:cNvPr id="1" name=""/>
+        <p:cNvGrpSpPr/>
+        <p:nvPr/>
+      </p:nvGrpSpPr>
+      <p:grpSpPr>
+        <a:xfrm>
+          <a:off x="0" y="0"/>
+          <a:ext cx="0" cy="0"/>
+          <a:chOff x="0" y="0"/>
+          <a:chExt cx="0" cy="0"/>
+        </a:xfrm>
+      </p:grpSpPr>
+      <p:pic>
+        <p:nvPicPr>
+          <p:cNvPr id="5" name="Picture 4"/>
+          <p:cNvPicPr>
+            <a:picLocks noChangeAspect="1"/>
+          </p:cNvPicPr>
+          <p:nvPr/>
+        </p:nvPicPr>
+        <p:blipFill>
+          <a:blip r:embed="rId2"/>
+          <a:stretch>
+            <a:fillRect/>
+          </a:stretch>
+        </p:blipFill>
+        <p:spPr>
+          <a:xfrm>
+            <a:off x="0" y="0"/>
+            <a:ext cx="2362200" cy="333375"/>
+          </a:xfrm>
+          <a:prstGeom prst="rect">
+            <a:avLst/>
+          </a:prstGeom>
+        </p:spPr>
+      </p:pic>
+      <p:pic>
+        <p:nvPicPr>
+          <p:cNvPr id="8" name="Picture 7"/>
+          <p:cNvPicPr>
+            <a:picLocks noChangeAspect="1"/>
+          </p:cNvPicPr>
+          <p:nvPr/>
+        </p:nvPicPr>
+        <p:blipFill>
+          <a:blip r:embed="rId3"/>
+          <a:stretch>
+            <a:fillRect/>
+          </a:stretch>
+        </p:blipFill>
+        <p:spPr>
+          <a:xfrm>
+            <a:off x="1181100" y="820079"/>
+            <a:ext cx="2667000" cy="266700"/>
+          </a:xfrm>
+          <a:prstGeom prst="rect">
+            <a:avLst/>
+          </a:prstGeom>
+        </p:spPr>
+      </p:pic>
+      <p:pic>
+        <p:nvPicPr>
+          <p:cNvPr id="9" name="Picture 8"/>
+          <p:cNvPicPr>
+            <a:picLocks noChangeAspect="1"/>
+          </p:cNvPicPr>
+          <p:nvPr/>
+        </p:nvPicPr>
+        <p:blipFill>
+          <a:blip r:embed="rId4"/>
+          <a:stretch>
+            <a:fillRect/>
+          </a:stretch>
+        </p:blipFill>
+        <p:spPr>
+          <a:xfrm>
+            <a:off x="814736" y="1573483"/>
+            <a:ext cx="2381250" cy="1333500"/>
+          </a:xfrm>
+          <a:prstGeom prst="rect">
+            <a:avLst/>
+          </a:prstGeom>
+        </p:spPr>
+      </p:pic>
+      <p:pic>
+        <p:nvPicPr>
+          <p:cNvPr id="10" name="Picture 9"/>
+          <p:cNvPicPr>
+            <a:picLocks noChangeAspect="1"/>
+          </p:cNvPicPr>
+          <p:nvPr/>
+        </p:nvPicPr>
+        <p:blipFill>
+          <a:blip r:embed="rId5"/>
+          <a:stretch>
+            <a:fillRect/>
+          </a:stretch>
+        </p:blipFill>
+        <p:spPr>
+          <a:xfrm>
+            <a:off x="4269638" y="1611583"/>
+            <a:ext cx="2314575" cy="1257300"/>
+          </a:xfrm>
+          <a:prstGeom prst="rect">
+            <a:avLst/>
+          </a:prstGeom>
+        </p:spPr>
+      </p:pic>
+      <p:pic>
+        <p:nvPicPr>
+          <p:cNvPr id="12" name="Picture 11"/>
+          <p:cNvPicPr>
+            <a:picLocks noChangeAspect="1"/>
+          </p:cNvPicPr>
+          <p:nvPr/>
+        </p:nvPicPr>
+        <p:blipFill>
+          <a:blip r:embed="rId6"/>
+          <a:stretch>
+            <a:fillRect/>
+          </a:stretch>
+        </p:blipFill>
+        <p:spPr>
+          <a:xfrm>
+            <a:off x="4269638" y="3420055"/>
+            <a:ext cx="2352675" cy="1266825"/>
+          </a:xfrm>
+          <a:prstGeom prst="rect">
+            <a:avLst/>
+          </a:prstGeom>
+        </p:spPr>
+      </p:pic>
+      <p:pic>
+        <p:nvPicPr>
+          <p:cNvPr id="13" name="Picture 12"/>
+          <p:cNvPicPr>
+            <a:picLocks noChangeAspect="1"/>
+          </p:cNvPicPr>
+          <p:nvPr/>
+        </p:nvPicPr>
+        <p:blipFill>
+          <a:blip r:embed="rId7"/>
+          <a:stretch>
+            <a:fillRect/>
+          </a:stretch>
+        </p:blipFill>
+        <p:spPr>
+          <a:xfrm>
+            <a:off x="4326787" y="5238052"/>
+            <a:ext cx="2200275" cy="1276350"/>
+          </a:xfrm>
+          <a:prstGeom prst="rect">
+            <a:avLst/>
+          </a:prstGeom>
+        </p:spPr>
+      </p:pic>
+      <p:pic>
+        <p:nvPicPr>
+          <p:cNvPr id="14" name="Picture 13"/>
+          <p:cNvPicPr>
+            <a:picLocks noChangeAspect="1"/>
+          </p:cNvPicPr>
+          <p:nvPr/>
+        </p:nvPicPr>
+        <p:blipFill>
+          <a:blip r:embed="rId8"/>
+          <a:stretch>
+            <a:fillRect/>
+          </a:stretch>
+        </p:blipFill>
+        <p:spPr>
+          <a:xfrm>
+            <a:off x="7884145" y="1573483"/>
+            <a:ext cx="2266950" cy="1343025"/>
+          </a:xfrm>
+          <a:prstGeom prst="rect">
+            <a:avLst/>
+          </a:prstGeom>
+        </p:spPr>
+      </p:pic>
+      <p:pic>
+        <p:nvPicPr>
+          <p:cNvPr id="15" name="Picture 14"/>
+          <p:cNvPicPr>
+            <a:picLocks noChangeAspect="1"/>
+          </p:cNvPicPr>
+          <p:nvPr/>
+        </p:nvPicPr>
+        <p:blipFill>
+          <a:blip r:embed="rId9"/>
+          <a:stretch>
+            <a:fillRect/>
+          </a:stretch>
+        </p:blipFill>
+        <p:spPr>
+          <a:xfrm>
+            <a:off x="6977759" y="3839155"/>
+            <a:ext cx="5038725" cy="1695450"/>
+          </a:xfrm>
+          <a:prstGeom prst="rect">
+            <a:avLst/>
+          </a:prstGeom>
+        </p:spPr>
+      </p:pic>
+    </p:spTree>
+    <p:extLst>
+      <p:ext uri="{BB962C8B-B14F-4D97-AF65-F5344CB8AC3E}">
+        <p14:creationId xmlns:p14="http://schemas.microsoft.com/office/powerpoint/2010/main" val="1323778576"/>
+      </p:ext>
+    </p:extLst>
+  </p:cSld>
+  <p:clrMapOvr>
+    <a:masterClrMapping/>
+  </p:clrMapOvr>
+  <p:timing>
+    <p:tnLst>
+      <p:par>
+        <p:cTn id="1" dur="indefinite" restart="never" nodeType="tmRoot">
+          <p:childTnLst>
+            <p:seq concurrent="1" nextAc="seek">
+              <p:cTn id="2" dur="indefinite" nodeType="mainSeq">
+                <p:childTnLst>
+                  <p:par>
+                    <p:cTn id="3" fill="hold">
+                      <p:stCondLst>
+                        <p:cond delay="indefinite"/>
+                      </p:stCondLst>
+                      <p:childTnLst>
+                        <p:par>
+                          <p:cTn id="4" fill="hold">
+                            <p:stCondLst>
+                              <p:cond delay="0"/>
+                            </p:stCondLst>
+                            <p:childTnLst>
+                              <p:par>
+                                <p:cTn id="5" presetID="1" presetClass="entr" presetSubtype="0" fill="hold" nodeType="clickEffect">
+                                  <p:stCondLst>
+                                    <p:cond delay="0"/>
+                                  </p:stCondLst>
+                                  <p:childTnLst>
+                                    <p:set>
+                                      <p:cBhvr>
+                                        <p:cTn id="6" dur="1" fill="hold">
+                                          <p:stCondLst>
+                                            <p:cond delay="0"/>
+                                          </p:stCondLst>
+                                        </p:cTn>
+                                        <p:tgtEl>
+                                          <p:spTgt spid="10"/>
+                                        </p:tgtEl>
+                                        <p:attrNameLst>
+                                          <p:attrName>style.visibility</p:attrName>
+                                        </p:attrNameLst>
+                                      </p:cBhvr>
+                                      <p:to>
+                                        <p:strVal val="visible"/>
+                                      </p:to>
+                                    </p:set>
+                                  </p:childTnLst>
+                                </p:cTn>
+                              </p:par>
+                            </p:childTnLst>
+                          </p:cTn>
+                        </p:par>
+                      </p:childTnLst>
+                    </p:cTn>
+                  </p:par>
+                  <p:par>
+                    <p:cTn id="7" fill="hold">
+                      <p:stCondLst>
+                        <p:cond delay="indefinite"/>
+                      </p:stCondLst>
+                      <p:childTnLst>
+                        <p:par>
+                          <p:cTn id="8" fill="hold">
+                            <p:stCondLst>
+                              <p:cond delay="0"/>
+                            </p:stCondLst>
+                            <p:childTnLst>
+                              <p:par>
+                                <p:cTn id="9" presetID="1" presetClass="entr" presetSubtype="0" fill="hold" nodeType="clickEffect">
+                                  <p:stCondLst>
+                                    <p:cond delay="0"/>
+                                  </p:stCondLst>
+                                  <p:childTnLst>
+                                    <p:set>
+                                      <p:cBhvr>
+                                        <p:cTn id="10" dur="1" fill="hold">
+                                          <p:stCondLst>
+                                            <p:cond delay="0"/>
+                                          </p:stCondLst>
+                                        </p:cTn>
+                                        <p:tgtEl>
+                                          <p:spTgt spid="12"/>
+                                        </p:tgtEl>
+                                        <p:attrNameLst>
+                                          <p:attrName>style.visibility</p:attrName>
+                                        </p:attrNameLst>
+                                      </p:cBhvr>
+                                      <p:to>
+                                        <p:strVal val="visible"/>
+                                      </p:to>
+                                    </p:set>
+                                  </p:childTnLst>
+                                </p:cTn>
+                              </p:par>
+                            </p:childTnLst>
+                          </p:cTn>
+                        </p:par>
+                      </p:childTnLst>
+                    </p:cTn>
+                  </p:par>
+                  <p:par>
+                    <p:cTn id="11" fill="hold">
+                      <p:stCondLst>
+                        <p:cond delay="indefinite"/>
+                      </p:stCondLst>
+                      <p:childTnLst>
+                        <p:par>
+                          <p:cTn id="12" fill="hold">
+                            <p:stCondLst>
+                              <p:cond delay="0"/>
+                            </p:stCondLst>
+                            <p:childTnLst>
+                              <p:par>
+                                <p:cTn id="13" presetID="1" presetClass="entr" presetSubtype="0" fill="hold" nodeType="clickEffect">
+                                  <p:stCondLst>
+                                    <p:cond delay="0"/>
+                                  </p:stCondLst>
+                                  <p:childTnLst>
+                                    <p:set>
+                                      <p:cBhvr>
+                                        <p:cTn id="14" dur="1" fill="hold">
+                                          <p:stCondLst>
+                                            <p:cond delay="0"/>
+                                          </p:stCondLst>
+                                        </p:cTn>
+                                        <p:tgtEl>
+                                          <p:spTgt spid="13"/>
+                                        </p:tgtEl>
+                                        <p:attrNameLst>
+                                          <p:attrName>style.visibility</p:attrName>
+                                        </p:attrNameLst>
+                                      </p:cBhvr>
+                                      <p:to>
+                                        <p:strVal val="visible"/>
+                                      </p:to>
+                                    </p:set>
+                                  </p:childTnLst>
+                                </p:cTn>
+                              </p:par>
+                            </p:childTnLst>
+                          </p:cTn>
+                        </p:par>
+                      </p:childTnLst>
+                    </p:cTn>
+                  </p:par>
+                  <p:par>
+                    <p:cTn id="15" fill="hold">
+                      <p:stCondLst>
+                        <p:cond delay="indefinite"/>
+                      </p:stCondLst>
+                      <p:childTnLst>
+                        <p:par>
+                          <p:cTn id="16" fill="hold">
+                            <p:stCondLst>
+                              <p:cond delay="0"/>
+                            </p:stCondLst>
+                            <p:childTnLst>
+                              <p:par>
+                                <p:cTn id="17" presetID="1" presetClass="entr" presetSubtype="0" fill="hold" nodeType="clickEffect">
+                                  <p:stCondLst>
+                                    <p:cond delay="0"/>
+                                  </p:stCondLst>
+                                  <p:childTnLst>
+                                    <p:set>
+                                      <p:cBhvr>
+                                        <p:cTn id="18" dur="1" fill="hold">
+                                          <p:stCondLst>
+                                            <p:cond delay="0"/>
+                                          </p:stCondLst>
+                                        </p:cTn>
+                                        <p:tgtEl>
+                                          <p:spTgt spid="14"/>
+                                        </p:tgtEl>
+                                        <p:attrNameLst>
+                                          <p:attrName>style.visibility</p:attrName>
+                                        </p:attrNameLst>
+                                      </p:cBhvr>
+                                      <p:to>
+                                        <p:strVal val="visible"/>
+                                      </p:to>
+                                    </p:set>
+                                  </p:childTnLst>
+                                </p:cTn>
+                              </p:par>
+                            </p:childTnLst>
+                          </p:cTn>
+                        </p:par>
+                      </p:childTnLst>
+                    </p:cTn>
+                  </p:par>
+                  <p:par>
+                    <p:cTn id="19" fill="hold">
+                      <p:stCondLst>
+                        <p:cond delay="indefinite"/>
+                      </p:stCondLst>
+                      <p:childTnLst>
+                        <p:par>
+                          <p:cTn id="20" fill="hold">
+                            <p:stCondLst>
+                              <p:cond delay="0"/>
+                            </p:stCondLst>
+                            <p:childTnLst>
+                              <p:par>
+                                <p:cTn id="21" presetID="1" presetClass="entr" presetSubtype="0" fill="hold" nodeType="clickEffect">
+                                  <p:stCondLst>
+                                    <p:cond delay="0"/>
+                                  </p:stCondLst>
+                                  <p:childTnLst>
+                                    <p:set>
+                                      <p:cBhvr>
+                                        <p:cTn id="22" dur="1" fill="hold">
+                                          <p:stCondLst>
+                                            <p:cond delay="0"/>
+                                          </p:stCondLst>
+                                        </p:cTn>
+                                        <p:tgtEl>
+                                          <p:spTgt spid="15"/>
                                         </p:tgtEl>
                                         <p:attrNameLst>
                                           <p:attrName>style.visibility</p:attrName>

</xml_diff>